<commit_message>
Updated silhouette and fixed diagonal values
</commit_message>
<xml_diff>
--- a/Aljaz/Naloga1/Aljaž_Rakovec_hw1.pptx
+++ b/Aljaz/Naloga1/Aljaž_Rakovec_hw1.pptx
@@ -8,8 +8,10 @@
     <p:sldId id="257" r:id="rId2"/>
     <p:sldId id="258" r:id="rId3"/>
     <p:sldId id="259" r:id="rId4"/>
-    <p:sldId id="260" r:id="rId5"/>
-    <p:sldId id="261" r:id="rId6"/>
+    <p:sldId id="262" r:id="rId5"/>
+    <p:sldId id="263" r:id="rId6"/>
+    <p:sldId id="260" r:id="rId7"/>
+    <p:sldId id="261" r:id="rId8"/>
   </p:sldIdLst>
   <p:sldSz cx="12192000" cy="6858000"/>
   <p:notesSz cx="6858000" cy="9144000"/>
@@ -3362,49 +3364,420 @@
             <p:ph type="title"/>
           </p:nvPr>
         </p:nvSpPr>
+        <p:spPr>
+          <a:xfrm>
+            <a:off x="838200" y="413251"/>
+            <a:ext cx="10515600" cy="1325563"/>
+          </a:xfrm>
+        </p:spPr>
+        <p:txBody>
+          <a:bodyPr/>
+          <a:lstStyle/>
+          <a:p>
+            <a:r>
+              <a:rPr lang="sl-SI"/>
+              <a:t>Podatki</a:t>
+            </a:r>
+            <a:endParaRPr lang="sl-SI" dirty="0"/>
+          </a:p>
+        </p:txBody>
+      </p:sp>
+      <p:sp>
+        <p:nvSpPr>
+          <p:cNvPr id="3" name="Content Placeholder 2">
+            <a:extLst>
+              <a:ext uri="{FF2B5EF4-FFF2-40B4-BE49-F238E27FC236}">
+                <a16:creationId xmlns:a16="http://schemas.microsoft.com/office/drawing/2014/main" id="{F448FC76-9EB3-D0BC-E4F1-402AF0C2B4B8}"/>
+              </a:ext>
+            </a:extLst>
+          </p:cNvPr>
+          <p:cNvSpPr>
+            <a:spLocks noGrp="1"/>
+          </p:cNvSpPr>
+          <p:nvPr>
+            <p:ph idx="1"/>
+          </p:nvPr>
+        </p:nvSpPr>
         <p:spPr/>
         <p:txBody>
-          <a:bodyPr/>
-          <a:lstStyle/>
-          <a:p>
-            <a:r>
-              <a:rPr lang="sl-SI" dirty="0"/>
-              <a:t>Podatki</a:t>
-            </a:r>
-          </a:p>
-        </p:txBody>
-      </p:sp>
-      <p:sp>
-        <p:nvSpPr>
-          <p:cNvPr id="3" name="Content Placeholder 2">
-            <a:extLst>
-              <a:ext uri="{FF2B5EF4-FFF2-40B4-BE49-F238E27FC236}">
-                <a16:creationId xmlns:a16="http://schemas.microsoft.com/office/drawing/2014/main" id="{F448FC76-9EB3-D0BC-E4F1-402AF0C2B4B8}"/>
-              </a:ext>
-            </a:extLst>
-          </p:cNvPr>
-          <p:cNvSpPr>
-            <a:spLocks noGrp="1"/>
-          </p:cNvSpPr>
-          <p:nvPr>
-            <p:ph idx="1"/>
-          </p:nvPr>
-        </p:nvSpPr>
-        <p:spPr/>
-        <p:txBody>
-          <a:bodyPr/>
-          <a:lstStyle/>
-          <a:p>
-            <a:r>
-              <a:rPr lang="sl-SI" b="0" i="0" dirty="0">
+          <a:bodyPr>
+            <a:normAutofit/>
+          </a:bodyPr>
+          <a:lstStyle/>
+          <a:p>
+            <a:r>
+              <a:rPr lang="en-GB" b="0" i="0" dirty="0" err="1">
                 <a:solidFill>
                   <a:srgbClr val="333333"/>
                 </a:solidFill>
                 <a:effectLst/>
                 <a:latin typeface="Helvetica Neue"/>
               </a:rPr>
-              <a:t>Katere podatke ste analizirali? </a:t>
-            </a:r>
+              <a:t>Obdelava</a:t>
+            </a:r>
+            <a:r>
+              <a:rPr lang="en-GB" b="0" i="0" dirty="0">
+                <a:solidFill>
+                  <a:srgbClr val="333333"/>
+                </a:solidFill>
+                <a:effectLst/>
+                <a:latin typeface="Helvetica Neue"/>
+              </a:rPr>
+              <a:t> pred </a:t>
+            </a:r>
+            <a:r>
+              <a:rPr lang="en-GB" b="0" i="0" dirty="0" err="1">
+                <a:solidFill>
+                  <a:srgbClr val="333333"/>
+                </a:solidFill>
+                <a:effectLst/>
+                <a:latin typeface="Helvetica Neue"/>
+              </a:rPr>
+              <a:t>ustvarjanjem</a:t>
+            </a:r>
+            <a:r>
+              <a:rPr lang="en-GB" b="0" i="0" dirty="0">
+                <a:solidFill>
+                  <a:srgbClr val="333333"/>
+                </a:solidFill>
+                <a:effectLst/>
+                <a:latin typeface="Helvetica Neue"/>
+              </a:rPr>
+              <a:t> </a:t>
+            </a:r>
+            <a:r>
+              <a:rPr lang="en-GB" b="0" i="0" dirty="0" err="1">
+                <a:solidFill>
+                  <a:srgbClr val="333333"/>
+                </a:solidFill>
+                <a:effectLst/>
+                <a:latin typeface="Helvetica Neue"/>
+              </a:rPr>
+              <a:t>profila</a:t>
+            </a:r>
+            <a:r>
+              <a:rPr lang="en-GB" b="0" i="0" dirty="0">
+                <a:solidFill>
+                  <a:srgbClr val="333333"/>
+                </a:solidFill>
+                <a:effectLst/>
+                <a:latin typeface="Helvetica Neue"/>
+              </a:rPr>
+              <a:t>:</a:t>
+            </a:r>
+          </a:p>
+          <a:p>
+            <a:pPr lvl="1"/>
+            <a:r>
+              <a:rPr lang="en-GB" dirty="0" err="1">
+                <a:solidFill>
+                  <a:srgbClr val="333333"/>
+                </a:solidFill>
+                <a:latin typeface="Helvetica Neue"/>
+              </a:rPr>
+              <a:t>Izbris</a:t>
+            </a:r>
+            <a:r>
+              <a:rPr lang="en-GB" dirty="0">
+                <a:solidFill>
+                  <a:srgbClr val="333333"/>
+                </a:solidFill>
+                <a:latin typeface="Helvetica Neue"/>
+              </a:rPr>
+              <a:t> </a:t>
+            </a:r>
+            <a:r>
+              <a:rPr lang="en-GB" dirty="0" err="1">
+                <a:solidFill>
+                  <a:srgbClr val="333333"/>
+                </a:solidFill>
+                <a:latin typeface="Helvetica Neue"/>
+              </a:rPr>
+              <a:t>duplikatov</a:t>
+            </a:r>
+            <a:r>
+              <a:rPr lang="en-GB" dirty="0">
+                <a:solidFill>
+                  <a:srgbClr val="333333"/>
+                </a:solidFill>
+                <a:latin typeface="Helvetica Neue"/>
+              </a:rPr>
+              <a:t> in </a:t>
+            </a:r>
+            <a:r>
+              <a:rPr lang="en-GB" dirty="0" err="1">
+                <a:solidFill>
+                  <a:srgbClr val="333333"/>
+                </a:solidFill>
+                <a:latin typeface="Helvetica Neue"/>
+              </a:rPr>
+              <a:t>stoplcev</a:t>
+            </a:r>
+            <a:r>
+              <a:rPr lang="en-GB" dirty="0">
+                <a:solidFill>
+                  <a:srgbClr val="333333"/>
+                </a:solidFill>
+                <a:latin typeface="Helvetica Neue"/>
+              </a:rPr>
+              <a:t> “Duplicates” in “Edition”</a:t>
+            </a:r>
+          </a:p>
+          <a:p>
+            <a:pPr lvl="1"/>
+            <a:r>
+              <a:rPr lang="en-GB" b="0" i="0" dirty="0" err="1">
+                <a:solidFill>
+                  <a:srgbClr val="333333"/>
+                </a:solidFill>
+                <a:effectLst/>
+                <a:latin typeface="Helvetica Neue"/>
+              </a:rPr>
+              <a:t>Izbris</a:t>
+            </a:r>
+            <a:r>
+              <a:rPr lang="en-GB" b="0" i="0" dirty="0">
+                <a:solidFill>
+                  <a:srgbClr val="333333"/>
+                </a:solidFill>
+                <a:effectLst/>
+                <a:latin typeface="Helvetica Neue"/>
+              </a:rPr>
+              <a:t> </a:t>
+            </a:r>
+            <a:r>
+              <a:rPr lang="en-GB" b="0" i="0" dirty="0" err="1">
+                <a:solidFill>
+                  <a:srgbClr val="333333"/>
+                </a:solidFill>
+                <a:effectLst/>
+                <a:latin typeface="Helvetica Neue"/>
+              </a:rPr>
+              <a:t>nefinalnih</a:t>
+            </a:r>
+            <a:r>
+              <a:rPr lang="en-GB" b="0" i="0" dirty="0">
+                <a:solidFill>
+                  <a:srgbClr val="333333"/>
+                </a:solidFill>
+                <a:effectLst/>
+                <a:latin typeface="Helvetica Neue"/>
+              </a:rPr>
+              <a:t> </a:t>
+            </a:r>
+            <a:r>
+              <a:rPr lang="en-GB" b="0" i="0" dirty="0" err="1">
+                <a:solidFill>
+                  <a:srgbClr val="333333"/>
+                </a:solidFill>
+                <a:effectLst/>
+                <a:latin typeface="Helvetica Neue"/>
+              </a:rPr>
+              <a:t>podatkov</a:t>
+            </a:r>
+            <a:r>
+              <a:rPr lang="en-GB" b="0" i="0" dirty="0">
+                <a:solidFill>
+                  <a:srgbClr val="333333"/>
+                </a:solidFill>
+                <a:effectLst/>
+                <a:latin typeface="Helvetica Neue"/>
+              </a:rPr>
+              <a:t> in </a:t>
+            </a:r>
+            <a:r>
+              <a:rPr lang="en-GB" dirty="0" err="1">
+                <a:solidFill>
+                  <a:srgbClr val="333333"/>
+                </a:solidFill>
+                <a:latin typeface="Helvetica Neue"/>
+              </a:rPr>
+              <a:t>stolpca</a:t>
+            </a:r>
+            <a:r>
+              <a:rPr lang="en-GB" dirty="0">
+                <a:solidFill>
+                  <a:srgbClr val="333333"/>
+                </a:solidFill>
+                <a:latin typeface="Helvetica Neue"/>
+              </a:rPr>
+              <a:t> “(semi-) final”</a:t>
+            </a:r>
+            <a:endParaRPr lang="en-GB" b="0" i="0" dirty="0">
+              <a:solidFill>
+                <a:srgbClr val="333333"/>
+              </a:solidFill>
+              <a:effectLst/>
+              <a:latin typeface="Helvetica Neue"/>
+            </a:endParaRPr>
+          </a:p>
+          <a:p>
+            <a:pPr lvl="1"/>
+            <a:r>
+              <a:rPr lang="en-US" dirty="0" err="1">
+                <a:solidFill>
+                  <a:srgbClr val="333333"/>
+                </a:solidFill>
+                <a:latin typeface="Helvetica Neue"/>
+              </a:rPr>
+              <a:t>Izbris</a:t>
+            </a:r>
+            <a:r>
+              <a:rPr lang="en-US" dirty="0">
+                <a:solidFill>
+                  <a:srgbClr val="333333"/>
+                </a:solidFill>
+                <a:latin typeface="Helvetica Neue"/>
+              </a:rPr>
+              <a:t> </a:t>
+            </a:r>
+            <a:r>
+              <a:rPr lang="en-US" dirty="0" err="1">
+                <a:solidFill>
+                  <a:srgbClr val="333333"/>
+                </a:solidFill>
+                <a:latin typeface="Helvetica Neue"/>
+              </a:rPr>
+              <a:t>podatkov</a:t>
+            </a:r>
+            <a:r>
+              <a:rPr lang="en-US" dirty="0">
+                <a:solidFill>
+                  <a:srgbClr val="333333"/>
+                </a:solidFill>
+                <a:latin typeface="Helvetica Neue"/>
+              </a:rPr>
+              <a:t> pred </a:t>
+            </a:r>
+            <a:r>
+              <a:rPr lang="en-US" dirty="0" err="1">
+                <a:solidFill>
+                  <a:srgbClr val="333333"/>
+                </a:solidFill>
+                <a:latin typeface="Helvetica Neue"/>
+              </a:rPr>
+              <a:t>letom</a:t>
+            </a:r>
+            <a:r>
+              <a:rPr lang="en-US" dirty="0">
+                <a:solidFill>
+                  <a:srgbClr val="333333"/>
+                </a:solidFill>
+                <a:latin typeface="Helvetica Neue"/>
+              </a:rPr>
+              <a:t> 2016 - </a:t>
+            </a:r>
+            <a:r>
+              <a:rPr lang="en-US" dirty="0" err="1">
+                <a:solidFill>
+                  <a:srgbClr val="333333"/>
+                </a:solidFill>
+                <a:latin typeface="Helvetica Neue"/>
+              </a:rPr>
+              <a:t>spremenitev</a:t>
+            </a:r>
+            <a:r>
+              <a:rPr lang="en-US" dirty="0">
+                <a:solidFill>
+                  <a:srgbClr val="333333"/>
+                </a:solidFill>
+                <a:latin typeface="Helvetica Neue"/>
+              </a:rPr>
+              <a:t> </a:t>
+            </a:r>
+            <a:r>
+              <a:rPr lang="en-US" dirty="0" err="1">
+                <a:solidFill>
+                  <a:srgbClr val="333333"/>
+                </a:solidFill>
+                <a:latin typeface="Helvetica Neue"/>
+              </a:rPr>
+              <a:t>sistema</a:t>
+            </a:r>
+            <a:r>
+              <a:rPr lang="en-US" dirty="0">
+                <a:solidFill>
+                  <a:srgbClr val="333333"/>
+                </a:solidFill>
+                <a:latin typeface="Helvetica Neue"/>
+              </a:rPr>
+              <a:t> </a:t>
+            </a:r>
+            <a:r>
+              <a:rPr lang="en-US" dirty="0" err="1">
+                <a:solidFill>
+                  <a:srgbClr val="333333"/>
+                </a:solidFill>
+                <a:latin typeface="Helvetica Neue"/>
+              </a:rPr>
+              <a:t>glasovanja</a:t>
+            </a:r>
+            <a:endParaRPr lang="en-US" dirty="0">
+              <a:solidFill>
+                <a:srgbClr val="333333"/>
+              </a:solidFill>
+              <a:latin typeface="Helvetica Neue"/>
+            </a:endParaRPr>
+          </a:p>
+          <a:p>
+            <a:pPr lvl="1"/>
+            <a:r>
+              <a:rPr lang="en-US" dirty="0" err="1">
+                <a:solidFill>
+                  <a:srgbClr val="333333"/>
+                </a:solidFill>
+                <a:latin typeface="Helvetica Neue"/>
+              </a:rPr>
+              <a:t>Delitev</a:t>
+            </a:r>
+            <a:r>
+              <a:rPr lang="en-US" dirty="0">
+                <a:solidFill>
+                  <a:srgbClr val="333333"/>
+                </a:solidFill>
+                <a:latin typeface="Helvetica Neue"/>
+              </a:rPr>
+              <a:t> </a:t>
+            </a:r>
+            <a:r>
+              <a:rPr lang="en-US" dirty="0" err="1">
+                <a:solidFill>
+                  <a:srgbClr val="333333"/>
+                </a:solidFill>
+                <a:latin typeface="Helvetica Neue"/>
+              </a:rPr>
+              <a:t>podatkov</a:t>
+            </a:r>
+            <a:r>
+              <a:rPr lang="en-US" dirty="0">
+                <a:solidFill>
+                  <a:srgbClr val="333333"/>
+                </a:solidFill>
+                <a:latin typeface="Helvetica Neue"/>
+              </a:rPr>
+              <a:t> </a:t>
+            </a:r>
+            <a:r>
+              <a:rPr lang="en-US" dirty="0" err="1">
+                <a:solidFill>
+                  <a:srgbClr val="333333"/>
+                </a:solidFill>
+                <a:latin typeface="Helvetica Neue"/>
+              </a:rPr>
+              <a:t>na</a:t>
+            </a:r>
+            <a:r>
+              <a:rPr lang="en-US" dirty="0">
+                <a:solidFill>
+                  <a:srgbClr val="333333"/>
+                </a:solidFill>
+                <a:latin typeface="Helvetica Neue"/>
+              </a:rPr>
+              <a:t> “Televoting” in “Jury”</a:t>
+            </a:r>
+          </a:p>
+          <a:p>
+            <a:pPr lvl="1"/>
             <a:endParaRPr lang="en-US" b="0" i="0" dirty="0">
               <a:solidFill>
                 <a:srgbClr val="333333"/>
@@ -3415,57 +3788,220 @@
           </a:p>
           <a:p>
             <a:r>
-              <a:rPr lang="sl-SI" b="0" i="0" dirty="0">
-                <a:solidFill>
-                  <a:srgbClr val="333333"/>
-                </a:solidFill>
-                <a:effectLst/>
-                <a:latin typeface="Helvetica Neue"/>
-              </a:rPr>
-              <a:t>Kako ste iz podatkov izluščili profile glasovanja? </a:t>
-            </a:r>
-            <a:endParaRPr lang="en-US" b="0" i="0" dirty="0">
+              <a:rPr lang="en-US" dirty="0" err="1">
+                <a:solidFill>
+                  <a:srgbClr val="333333"/>
+                </a:solidFill>
+                <a:latin typeface="Helvetica Neue"/>
+              </a:rPr>
+              <a:t>Profil</a:t>
+            </a:r>
+            <a:r>
+              <a:rPr lang="en-US" dirty="0">
+                <a:solidFill>
+                  <a:srgbClr val="333333"/>
+                </a:solidFill>
+                <a:latin typeface="Helvetica Neue"/>
+              </a:rPr>
+              <a:t>:</a:t>
+            </a:r>
+          </a:p>
+          <a:p>
+            <a:pPr lvl="1"/>
+            <a:r>
+              <a:rPr lang="en-US" dirty="0">
+                <a:solidFill>
+                  <a:srgbClr val="333333"/>
+                </a:solidFill>
+                <a:latin typeface="Helvetica Neue"/>
+              </a:rPr>
+              <a:t>Matrika </a:t>
+            </a:r>
+            <a:r>
+              <a:rPr lang="en-US" dirty="0" err="1">
+                <a:solidFill>
+                  <a:srgbClr val="333333"/>
+                </a:solidFill>
+                <a:latin typeface="Helvetica Neue"/>
+              </a:rPr>
+              <a:t>povprečnih</a:t>
+            </a:r>
+            <a:r>
+              <a:rPr lang="en-US" dirty="0">
+                <a:solidFill>
+                  <a:srgbClr val="333333"/>
+                </a:solidFill>
+                <a:latin typeface="Helvetica Neue"/>
+              </a:rPr>
+              <a:t> </a:t>
+            </a:r>
+            <a:r>
+              <a:rPr lang="en-US" dirty="0" err="1">
+                <a:solidFill>
+                  <a:srgbClr val="333333"/>
+                </a:solidFill>
+                <a:latin typeface="Helvetica Neue"/>
+              </a:rPr>
+              <a:t>danih</a:t>
+            </a:r>
+            <a:r>
+              <a:rPr lang="en-US" dirty="0">
+                <a:solidFill>
+                  <a:srgbClr val="333333"/>
+                </a:solidFill>
+                <a:latin typeface="Helvetica Neue"/>
+              </a:rPr>
+              <a:t> </a:t>
+            </a:r>
+            <a:r>
+              <a:rPr lang="en-US" dirty="0" err="1">
+                <a:solidFill>
+                  <a:srgbClr val="333333"/>
+                </a:solidFill>
+                <a:latin typeface="Helvetica Neue"/>
+              </a:rPr>
+              <a:t>točk</a:t>
+            </a:r>
+            <a:r>
+              <a:rPr lang="en-US" dirty="0">
+                <a:solidFill>
+                  <a:srgbClr val="333333"/>
+                </a:solidFill>
+                <a:latin typeface="Helvetica Neue"/>
+              </a:rPr>
+              <a:t> </a:t>
+            </a:r>
+            <a:r>
+              <a:rPr lang="en-US" dirty="0" err="1">
+                <a:solidFill>
+                  <a:srgbClr val="333333"/>
+                </a:solidFill>
+                <a:latin typeface="Helvetica Neue"/>
+              </a:rPr>
+              <a:t>vsaki</a:t>
+            </a:r>
+            <a:r>
+              <a:rPr lang="en-US" dirty="0">
+                <a:solidFill>
+                  <a:srgbClr val="333333"/>
+                </a:solidFill>
+                <a:latin typeface="Helvetica Neue"/>
+              </a:rPr>
+              <a:t> </a:t>
+            </a:r>
+            <a:r>
+              <a:rPr lang="en-US" dirty="0" err="1">
+                <a:solidFill>
+                  <a:srgbClr val="333333"/>
+                </a:solidFill>
+                <a:latin typeface="Helvetica Neue"/>
+              </a:rPr>
+              <a:t>državi</a:t>
+            </a:r>
+            <a:endParaRPr lang="en-US" dirty="0">
               <a:solidFill>
                 <a:srgbClr val="333333"/>
               </a:solidFill>
-              <a:effectLst/>
               <a:latin typeface="Helvetica Neue"/>
             </a:endParaRPr>
           </a:p>
           <a:p>
-            <a:r>
-              <a:rPr lang="sl-SI" b="0" i="0" dirty="0">
-                <a:solidFill>
-                  <a:srgbClr val="333333"/>
-                </a:solidFill>
-                <a:effectLst/>
-                <a:latin typeface="Helvetica Neue"/>
-              </a:rPr>
-              <a:t>Kako ste ustvarili profil glasovanja posameznih držav? </a:t>
-            </a:r>
-            <a:endParaRPr lang="en-US" b="0" i="0" dirty="0">
+            <a:pPr lvl="1"/>
+            <a:r>
+              <a:rPr lang="en-US" dirty="0" err="1"/>
+              <a:t>Neznanih</a:t>
+            </a:r>
+            <a:r>
+              <a:rPr lang="en-US" dirty="0"/>
+              <a:t> </a:t>
+            </a:r>
+            <a:r>
+              <a:rPr lang="en-US" dirty="0" err="1"/>
+              <a:t>vrednosti</a:t>
+            </a:r>
+            <a:r>
+              <a:rPr lang="en-US" dirty="0"/>
+              <a:t>: </a:t>
+            </a:r>
+            <a:r>
+              <a:rPr lang="en-US" dirty="0" err="1"/>
+              <a:t>ni</a:t>
+            </a:r>
+            <a:r>
+              <a:rPr lang="en-GB" dirty="0" err="1"/>
+              <a:t>čle</a:t>
+            </a:r>
+            <a:r>
+              <a:rPr lang="en-GB" dirty="0"/>
+              <a:t>, </a:t>
+            </a:r>
+            <a:r>
+              <a:rPr lang="en-GB" dirty="0" err="1"/>
+              <a:t>razen</a:t>
+            </a:r>
+            <a:r>
+              <a:rPr lang="en-GB" dirty="0"/>
+              <a:t> </a:t>
+            </a:r>
+            <a:r>
+              <a:rPr lang="en-GB" dirty="0" err="1"/>
+              <a:t>na</a:t>
+            </a:r>
+            <a:r>
+              <a:rPr lang="en-GB" dirty="0"/>
+              <a:t> </a:t>
+            </a:r>
+            <a:r>
+              <a:rPr lang="en-GB" dirty="0" err="1"/>
+              <a:t>diagonali</a:t>
+            </a:r>
+            <a:r>
+              <a:rPr lang="en-GB" dirty="0"/>
+              <a:t> </a:t>
+            </a:r>
+            <a:r>
+              <a:rPr lang="en-GB" dirty="0" err="1"/>
+              <a:t>matrike</a:t>
+            </a:r>
+            <a:endParaRPr lang="en-US" dirty="0">
               <a:solidFill>
                 <a:srgbClr val="333333"/>
               </a:solidFill>
-              <a:effectLst/>
               <a:latin typeface="Helvetica Neue"/>
             </a:endParaRPr>
           </a:p>
-          <a:p>
-            <a:r>
-              <a:rPr lang="sl-SI" b="0" i="0" dirty="0">
-                <a:solidFill>
-                  <a:srgbClr val="333333"/>
-                </a:solidFill>
-                <a:effectLst/>
-                <a:latin typeface="Helvetica Neue"/>
-              </a:rPr>
-              <a:t>Ste podatke kako obdelali (recimo glede neznanih vrednosti)?</a:t>
-            </a:r>
-            <a:endParaRPr lang="en-SI" dirty="0"/>
-          </a:p>
-        </p:txBody>
-      </p:sp>
+        </p:txBody>
+      </p:sp>
+      <p:pic>
+        <p:nvPicPr>
+          <p:cNvPr id="9" name="Picture 8">
+            <a:extLst>
+              <a:ext uri="{FF2B5EF4-FFF2-40B4-BE49-F238E27FC236}">
+                <a16:creationId xmlns:a16="http://schemas.microsoft.com/office/drawing/2014/main" id="{399E755C-D5C7-A540-D7B9-B9E0D5325C8B}"/>
+              </a:ext>
+            </a:extLst>
+          </p:cNvPr>
+          <p:cNvPicPr>
+            <a:picLocks noChangeAspect="1"/>
+          </p:cNvPicPr>
+          <p:nvPr/>
+        </p:nvPicPr>
+        <p:blipFill>
+          <a:blip r:embed="rId2"/>
+          <a:stretch>
+            <a:fillRect/>
+          </a:stretch>
+        </p:blipFill>
+        <p:spPr>
+          <a:xfrm>
+            <a:off x="4401553" y="92242"/>
+            <a:ext cx="7696200" cy="2438400"/>
+          </a:xfrm>
+          <a:prstGeom prst="rect">
+            <a:avLst/>
+          </a:prstGeom>
+        </p:spPr>
+      </p:pic>
     </p:spTree>
     <p:extLst>
       <p:ext uri="{BB962C8B-B14F-4D97-AF65-F5344CB8AC3E}">
@@ -3562,6 +4098,64 @@
               </a:rPr>
               <a:t>Kako ste računali razdalje med posameznimi profili ter med posameznimi skupinami? </a:t>
             </a:r>
+            <a:r>
+              <a:rPr lang="pl-PL" b="0" i="0" dirty="0">
+                <a:solidFill>
+                  <a:srgbClr val="333333"/>
+                </a:solidFill>
+                <a:effectLst/>
+                <a:latin typeface="Helvetica Neue"/>
+              </a:rPr>
+              <a:t>Zakaj ste se odločili za izbrane parametre?</a:t>
+            </a:r>
+            <a:endParaRPr lang="en-GB" b="0" i="0" dirty="0">
+              <a:solidFill>
+                <a:srgbClr val="333333"/>
+              </a:solidFill>
+              <a:effectLst/>
+              <a:latin typeface="Helvetica Neue"/>
+            </a:endParaRPr>
+          </a:p>
+          <a:p>
+            <a:r>
+              <a:rPr lang="en-US" dirty="0" err="1">
+                <a:solidFill>
+                  <a:srgbClr val="333333"/>
+                </a:solidFill>
+                <a:latin typeface="Helvetica Neue"/>
+              </a:rPr>
+              <a:t>K</a:t>
+            </a:r>
+            <a:r>
+              <a:rPr lang="en-US" b="0" i="0" dirty="0" err="1">
+                <a:solidFill>
+                  <a:srgbClr val="333333"/>
+                </a:solidFill>
+                <a:effectLst/>
+                <a:latin typeface="Helvetica Neue"/>
+              </a:rPr>
+              <a:t>oisinusna</a:t>
+            </a:r>
+            <a:r>
+              <a:rPr lang="en-US" b="0" i="0" dirty="0">
+                <a:solidFill>
+                  <a:srgbClr val="333333"/>
+                </a:solidFill>
+                <a:effectLst/>
+                <a:latin typeface="Helvetica Neue"/>
+              </a:rPr>
+              <a:t> </a:t>
+            </a:r>
+            <a:r>
+              <a:rPr lang="en-US" b="0" i="0" dirty="0" err="1">
+                <a:solidFill>
+                  <a:srgbClr val="333333"/>
+                </a:solidFill>
+                <a:effectLst/>
+                <a:latin typeface="Helvetica Neue"/>
+              </a:rPr>
+              <a:t>razdalja</a:t>
+            </a:r>
             <a:endParaRPr lang="en-US" b="0" i="0" dirty="0">
               <a:solidFill>
                 <a:srgbClr val="333333"/>
@@ -3571,17 +4165,304 @@
             </a:endParaRPr>
           </a:p>
           <a:p>
-            <a:r>
-              <a:rPr lang="sl-SI" b="0" i="0" dirty="0">
+            <a:pPr lvl="1"/>
+            <a:r>
+              <a:rPr lang="en-US" b="0" i="0" dirty="0" err="1">
                 <a:solidFill>
                   <a:srgbClr val="333333"/>
                 </a:solidFill>
                 <a:effectLst/>
                 <a:latin typeface="Helvetica Neue"/>
               </a:rPr>
-              <a:t>Zakaj ste se odločili za izbrane parametre?</a:t>
-            </a:r>
-            <a:endParaRPr lang="en-SI" dirty="0"/>
+              <a:t>Večdimenzionalni</a:t>
+            </a:r>
+            <a:r>
+              <a:rPr lang="en-US" b="0" i="0" dirty="0">
+                <a:solidFill>
+                  <a:srgbClr val="333333"/>
+                </a:solidFill>
+                <a:effectLst/>
+                <a:latin typeface="Helvetica Neue"/>
+              </a:rPr>
+              <a:t> </a:t>
+            </a:r>
+            <a:r>
+              <a:rPr lang="en-US" b="0" i="0" dirty="0" err="1">
+                <a:solidFill>
+                  <a:srgbClr val="333333"/>
+                </a:solidFill>
+                <a:effectLst/>
+                <a:latin typeface="Helvetica Neue"/>
+              </a:rPr>
+              <a:t>prostor</a:t>
+            </a:r>
+            <a:endParaRPr lang="en-US" b="0" i="0" dirty="0">
+              <a:solidFill>
+                <a:srgbClr val="333333"/>
+              </a:solidFill>
+              <a:effectLst/>
+              <a:latin typeface="Helvetica Neue"/>
+            </a:endParaRPr>
+          </a:p>
+          <a:p>
+            <a:r>
+              <a:rPr lang="en-US" dirty="0" err="1">
+                <a:solidFill>
+                  <a:srgbClr val="333333"/>
+                </a:solidFill>
+                <a:latin typeface="Helvetica Neue"/>
+              </a:rPr>
+              <a:t>Popolna</a:t>
+            </a:r>
+            <a:r>
+              <a:rPr lang="en-US" dirty="0">
+                <a:solidFill>
+                  <a:srgbClr val="333333"/>
+                </a:solidFill>
+                <a:latin typeface="Helvetica Neue"/>
+              </a:rPr>
+              <a:t> </a:t>
+            </a:r>
+            <a:r>
+              <a:rPr lang="en-US" dirty="0" err="1">
+                <a:solidFill>
+                  <a:srgbClr val="333333"/>
+                </a:solidFill>
+                <a:latin typeface="Helvetica Neue"/>
+              </a:rPr>
+              <a:t>povezanost</a:t>
+            </a:r>
+            <a:endParaRPr lang="en-US" dirty="0">
+              <a:solidFill>
+                <a:srgbClr val="333333"/>
+              </a:solidFill>
+              <a:latin typeface="Helvetica Neue"/>
+            </a:endParaRPr>
+          </a:p>
+          <a:p>
+            <a:pPr lvl="1"/>
+            <a:r>
+              <a:rPr lang="en-GB" dirty="0">
+                <a:solidFill>
+                  <a:srgbClr val="333333"/>
+                </a:solidFill>
+                <a:latin typeface="Helvetica Neue"/>
+              </a:rPr>
+              <a:t>V </a:t>
+            </a:r>
+            <a:r>
+              <a:rPr lang="en-GB" dirty="0" err="1">
+                <a:solidFill>
+                  <a:srgbClr val="333333"/>
+                </a:solidFill>
+                <a:latin typeface="Helvetica Neue"/>
+              </a:rPr>
+              <a:t>primejavi</a:t>
+            </a:r>
+            <a:r>
+              <a:rPr lang="en-GB" dirty="0">
+                <a:solidFill>
+                  <a:srgbClr val="333333"/>
+                </a:solidFill>
+                <a:latin typeface="Helvetica Neue"/>
+              </a:rPr>
+              <a:t> z </a:t>
+            </a:r>
+            <a:r>
+              <a:rPr lang="en-GB" dirty="0" err="1">
+                <a:solidFill>
+                  <a:srgbClr val="333333"/>
+                </a:solidFill>
+                <a:latin typeface="Helvetica Neue"/>
+              </a:rPr>
+              <a:t>enojno</a:t>
+            </a:r>
+            <a:r>
+              <a:rPr lang="en-GB" dirty="0">
+                <a:solidFill>
+                  <a:srgbClr val="333333"/>
+                </a:solidFill>
+                <a:latin typeface="Helvetica Neue"/>
+              </a:rPr>
+              <a:t> </a:t>
+            </a:r>
+            <a:r>
+              <a:rPr lang="en-GB" dirty="0" err="1">
+                <a:solidFill>
+                  <a:srgbClr val="333333"/>
+                </a:solidFill>
+                <a:latin typeface="Helvetica Neue"/>
+              </a:rPr>
+              <a:t>povezanostjo</a:t>
+            </a:r>
+            <a:r>
+              <a:rPr lang="en-GB" dirty="0">
+                <a:solidFill>
+                  <a:srgbClr val="333333"/>
+                </a:solidFill>
+                <a:latin typeface="Helvetica Neue"/>
+              </a:rPr>
+              <a:t>, ki </a:t>
+            </a:r>
+            <a:r>
+              <a:rPr lang="en-GB" dirty="0" err="1">
+                <a:solidFill>
+                  <a:srgbClr val="333333"/>
+                </a:solidFill>
+                <a:latin typeface="Helvetica Neue"/>
+              </a:rPr>
+              <a:t>sta</a:t>
+            </a:r>
+            <a:r>
+              <a:rPr lang="en-GB" dirty="0">
+                <a:solidFill>
+                  <a:srgbClr val="333333"/>
+                </a:solidFill>
+                <a:latin typeface="Helvetica Neue"/>
+              </a:rPr>
+              <a:t> </a:t>
+            </a:r>
+            <a:r>
+              <a:rPr lang="en-GB" dirty="0" err="1">
+                <a:solidFill>
+                  <a:srgbClr val="333333"/>
+                </a:solidFill>
+                <a:latin typeface="Helvetica Neue"/>
+              </a:rPr>
+              <a:t>tudi</a:t>
+            </a:r>
+            <a:r>
+              <a:rPr lang="en-GB" dirty="0">
+                <a:solidFill>
+                  <a:srgbClr val="333333"/>
+                </a:solidFill>
+                <a:latin typeface="Helvetica Neue"/>
+              </a:rPr>
+              <a:t> </a:t>
+            </a:r>
+            <a:r>
+              <a:rPr lang="en-GB" dirty="0" err="1">
+                <a:solidFill>
+                  <a:srgbClr val="333333"/>
+                </a:solidFill>
+                <a:latin typeface="Helvetica Neue"/>
+              </a:rPr>
+              <a:t>naredili</a:t>
+            </a:r>
+            <a:r>
+              <a:rPr lang="en-GB" dirty="0">
+                <a:solidFill>
+                  <a:srgbClr val="333333"/>
+                </a:solidFill>
+                <a:latin typeface="Helvetica Neue"/>
+              </a:rPr>
+              <a:t> lepe </a:t>
+            </a:r>
+            <a:r>
+              <a:rPr lang="en-GB" dirty="0" err="1">
+                <a:solidFill>
+                  <a:srgbClr val="333333"/>
+                </a:solidFill>
+                <a:latin typeface="Helvetica Neue"/>
+              </a:rPr>
+              <a:t>skupine</a:t>
+            </a:r>
+            <a:r>
+              <a:rPr lang="en-GB" dirty="0">
+                <a:solidFill>
+                  <a:srgbClr val="333333"/>
+                </a:solidFill>
+                <a:latin typeface="Helvetica Neue"/>
+              </a:rPr>
+              <a:t>, </a:t>
+            </a:r>
+            <a:r>
+              <a:rPr lang="en-GB" dirty="0" err="1">
+                <a:solidFill>
+                  <a:srgbClr val="333333"/>
+                </a:solidFill>
+                <a:latin typeface="Helvetica Neue"/>
+              </a:rPr>
+              <a:t>ampak</a:t>
+            </a:r>
+            <a:r>
+              <a:rPr lang="en-GB" dirty="0">
+                <a:solidFill>
+                  <a:srgbClr val="333333"/>
+                </a:solidFill>
+                <a:latin typeface="Helvetica Neue"/>
+              </a:rPr>
+              <a:t> </a:t>
+            </a:r>
+            <a:r>
+              <a:rPr lang="en-GB" dirty="0" err="1">
+                <a:solidFill>
+                  <a:srgbClr val="333333"/>
+                </a:solidFill>
+                <a:latin typeface="Helvetica Neue"/>
+              </a:rPr>
+              <a:t>na</a:t>
+            </a:r>
+            <a:r>
+              <a:rPr lang="en-GB" dirty="0">
+                <a:solidFill>
+                  <a:srgbClr val="333333"/>
+                </a:solidFill>
+                <a:latin typeface="Helvetica Neue"/>
+              </a:rPr>
+              <a:t> </a:t>
+            </a:r>
+            <a:r>
+              <a:rPr lang="en-GB" dirty="0" err="1">
+                <a:solidFill>
+                  <a:srgbClr val="333333"/>
+                </a:solidFill>
+                <a:latin typeface="Helvetica Neue"/>
+              </a:rPr>
+              <a:t>zelo</a:t>
+            </a:r>
+            <a:r>
+              <a:rPr lang="en-GB" dirty="0">
+                <a:solidFill>
+                  <a:srgbClr val="333333"/>
+                </a:solidFill>
+                <a:latin typeface="Helvetica Neue"/>
+              </a:rPr>
+              <a:t> </a:t>
+            </a:r>
+            <a:r>
+              <a:rPr lang="en-GB" dirty="0" err="1">
+                <a:solidFill>
+                  <a:srgbClr val="333333"/>
+                </a:solidFill>
+                <a:latin typeface="Helvetica Neue"/>
+              </a:rPr>
+              <a:t>različnih</a:t>
+            </a:r>
+            <a:r>
+              <a:rPr lang="en-GB" dirty="0">
+                <a:solidFill>
+                  <a:srgbClr val="333333"/>
+                </a:solidFill>
+                <a:latin typeface="Helvetica Neue"/>
+              </a:rPr>
+              <a:t> </a:t>
+            </a:r>
+            <a:r>
+              <a:rPr lang="en-GB" dirty="0" err="1">
+                <a:solidFill>
+                  <a:srgbClr val="333333"/>
+                </a:solidFill>
+                <a:latin typeface="Helvetica Neue"/>
+              </a:rPr>
+              <a:t>višinah</a:t>
+            </a:r>
+            <a:endParaRPr lang="en-GB" dirty="0">
+              <a:solidFill>
+                <a:srgbClr val="333333"/>
+              </a:solidFill>
+              <a:latin typeface="Helvetica Neue"/>
+            </a:endParaRPr>
           </a:p>
         </p:txBody>
       </p:sp>
@@ -3721,6 +4602,14 @@
 <file path=ppt/slides/slide4.xml><?xml version="1.0" encoding="utf-8"?>
 <p:sld xmlns:a="http://schemas.openxmlformats.org/drawingml/2006/main" xmlns:r="http://schemas.openxmlformats.org/officeDocument/2006/relationships" xmlns:p="http://schemas.openxmlformats.org/presentationml/2006/main">
   <p:cSld>
+    <p:bg>
+      <p:bgPr>
+        <a:solidFill>
+          <a:schemeClr val="bg1"/>
+        </a:solidFill>
+        <a:effectLst/>
+      </p:bgPr>
+    </p:bg>
     <p:spTree>
       <p:nvGrpSpPr>
         <p:cNvPr id="1" name=""/>
@@ -3737,101 +4626,168 @@
       </p:grpSpPr>
       <p:sp>
         <p:nvSpPr>
-          <p:cNvPr id="2" name="Title 1">
-            <a:extLst>
-              <a:ext uri="{FF2B5EF4-FFF2-40B4-BE49-F238E27FC236}">
-                <a16:creationId xmlns:a16="http://schemas.microsoft.com/office/drawing/2014/main" id="{FC4956DA-32A2-19B5-75BE-50DFBA508C50}"/>
-              </a:ext>
-            </a:extLst>
-          </p:cNvPr>
-          <p:cNvSpPr>
-            <a:spLocks noGrp="1"/>
-          </p:cNvSpPr>
-          <p:nvPr>
-            <p:ph type="title"/>
-          </p:nvPr>
-        </p:nvSpPr>
-        <p:spPr/>
-        <p:txBody>
-          <a:bodyPr/>
-          <a:lstStyle/>
-          <a:p>
-            <a:r>
-              <a:rPr lang="sl-SI" dirty="0"/>
-              <a:t>Argumenti</a:t>
-            </a:r>
-          </a:p>
-        </p:txBody>
-      </p:sp>
-      <p:sp>
-        <p:nvSpPr>
-          <p:cNvPr id="3" name="Content Placeholder 2">
-            <a:extLst>
-              <a:ext uri="{FF2B5EF4-FFF2-40B4-BE49-F238E27FC236}">
-                <a16:creationId xmlns:a16="http://schemas.microsoft.com/office/drawing/2014/main" id="{08DBEF08-4EA8-7388-1233-19FBA6713823}"/>
-              </a:ext>
-            </a:extLst>
-          </p:cNvPr>
-          <p:cNvSpPr>
-            <a:spLocks noGrp="1"/>
-          </p:cNvSpPr>
+          <p:cNvPr id="10" name="Rectangle 9">
+            <a:extLst>
+              <a:ext uri="{FF2B5EF4-FFF2-40B4-BE49-F238E27FC236}">
+                <a16:creationId xmlns:a16="http://schemas.microsoft.com/office/drawing/2014/main" id="{11B2B030-4738-4359-9E46-144B7C8BFF8B}"/>
+              </a:ext>
+              <a:ext uri="{C183D7F6-B498-43B3-948B-1728B52AA6E4}">
+                <adec:decorative xmlns:adec="http://schemas.microsoft.com/office/drawing/2017/decorative" val="1"/>
+              </a:ext>
+            </a:extLst>
+          </p:cNvPr>
+          <p:cNvSpPr>
+            <a:spLocks noGrp="1" noRot="1" noChangeAspect="1" noMove="1" noResize="1" noEditPoints="1" noAdjustHandles="1" noChangeArrowheads="1" noChangeShapeType="1" noTextEdit="1"/>
+          </p:cNvSpPr>
+          <p:nvPr>
+            <p:extLst>
+              <p:ext uri="{386F3935-93C4-4BCD-93E2-E3B085C9AB24}">
+                <p16:designElem xmlns:p16="http://schemas.microsoft.com/office/powerpoint/2015/main" val="1"/>
+              </p:ext>
+            </p:extLst>
+          </p:nvPr>
+        </p:nvSpPr>
+        <p:spPr>
+          <a:xfrm>
+            <a:off x="-1117" y="8300"/>
+            <a:ext cx="12193117" cy="6849700"/>
+          </a:xfrm>
+          <a:prstGeom prst="rect">
+            <a:avLst/>
+          </a:prstGeom>
+          <a:solidFill>
+            <a:schemeClr val="bg2">
+              <a:alpha val="40000"/>
+            </a:schemeClr>
+          </a:solidFill>
+          <a:ln>
+            <a:noFill/>
+          </a:ln>
+        </p:spPr>
+        <p:style>
+          <a:lnRef idx="2">
+            <a:schemeClr val="accent1">
+              <a:shade val="50000"/>
+            </a:schemeClr>
+          </a:lnRef>
+          <a:fillRef idx="1">
+            <a:schemeClr val="accent1"/>
+          </a:fillRef>
+          <a:effectRef idx="0">
+            <a:schemeClr val="accent1"/>
+          </a:effectRef>
+          <a:fontRef idx="minor">
+            <a:schemeClr val="lt1"/>
+          </a:fontRef>
+        </p:style>
+        <p:txBody>
+          <a:bodyPr rtlCol="0" anchor="ctr"/>
+          <a:lstStyle/>
+          <a:p>
+            <a:pPr algn="ctr"/>
+            <a:endParaRPr lang="en-US" dirty="0"/>
+          </a:p>
+        </p:txBody>
+      </p:sp>
+      <p:sp useBgFill="1">
+        <p:nvSpPr>
+          <p:cNvPr id="12" name="Rectangle 11">
+            <a:extLst>
+              <a:ext uri="{FF2B5EF4-FFF2-40B4-BE49-F238E27FC236}">
+                <a16:creationId xmlns:a16="http://schemas.microsoft.com/office/drawing/2014/main" id="{E722B2DD-E14D-4972-9D98-5D6E61B1B2D2}"/>
+              </a:ext>
+              <a:ext uri="{C183D7F6-B498-43B3-948B-1728B52AA6E4}">
+                <adec:decorative xmlns:adec="http://schemas.microsoft.com/office/drawing/2017/decorative" val="1"/>
+              </a:ext>
+            </a:extLst>
+          </p:cNvPr>
+          <p:cNvSpPr>
+            <a:spLocks noGrp="1" noRot="1" noChangeAspect="1" noMove="1" noResize="1" noEditPoints="1" noAdjustHandles="1" noChangeArrowheads="1" noChangeShapeType="1" noTextEdit="1"/>
+          </p:cNvSpPr>
+          <p:nvPr>
+            <p:extLst>
+              <p:ext uri="{386F3935-93C4-4BCD-93E2-E3B085C9AB24}">
+                <p16:designElem xmlns:p16="http://schemas.microsoft.com/office/powerpoint/2015/main" val="1"/>
+              </p:ext>
+            </p:extLst>
+          </p:nvPr>
+        </p:nvSpPr>
+        <p:spPr>
+          <a:xfrm>
+            <a:off x="0" y="0"/>
+            <a:ext cx="11144310" cy="6858000"/>
+          </a:xfrm>
+          <a:prstGeom prst="rect">
+            <a:avLst/>
+          </a:prstGeom>
+          <a:ln>
+            <a:noFill/>
+          </a:ln>
+          <a:effectLst/>
+        </p:spPr>
+        <p:style>
+          <a:lnRef idx="2">
+            <a:schemeClr val="accent1">
+              <a:shade val="50000"/>
+            </a:schemeClr>
+          </a:lnRef>
+          <a:fillRef idx="1">
+            <a:schemeClr val="accent1"/>
+          </a:fillRef>
+          <a:effectRef idx="0">
+            <a:schemeClr val="accent1"/>
+          </a:effectRef>
+          <a:fontRef idx="minor">
+            <a:schemeClr val="lt1"/>
+          </a:fontRef>
+        </p:style>
+        <p:txBody>
+          <a:bodyPr rtlCol="0" anchor="ctr"/>
+          <a:lstStyle/>
+          <a:p>
+            <a:pPr algn="ctr"/>
+            <a:endParaRPr lang="en-US"/>
+          </a:p>
+        </p:txBody>
+      </p:sp>
+      <p:pic>
+        <p:nvPicPr>
+          <p:cNvPr id="9" name="Content Placeholder 8" descr="A diagram of a graph&#10;&#10;Description automatically generated with medium confidence">
+            <a:extLst>
+              <a:ext uri="{FF2B5EF4-FFF2-40B4-BE49-F238E27FC236}">
+                <a16:creationId xmlns:a16="http://schemas.microsoft.com/office/drawing/2014/main" id="{E39E41AE-B0B2-80CB-ACE3-214FA1668426}"/>
+              </a:ext>
+            </a:extLst>
+          </p:cNvPr>
+          <p:cNvPicPr>
+            <a:picLocks noGrp="1" noChangeAspect="1"/>
+          </p:cNvPicPr>
           <p:nvPr>
             <p:ph idx="1"/>
           </p:nvPr>
-        </p:nvSpPr>
-        <p:spPr/>
-        <p:txBody>
-          <a:bodyPr/>
-          <a:lstStyle/>
-          <a:p>
-            <a:r>
-              <a:rPr lang="sl-SI" b="0" i="0" dirty="0">
-                <a:solidFill>
-                  <a:srgbClr val="333333"/>
-                </a:solidFill>
-                <a:effectLst/>
-                <a:latin typeface="Helvetica Neue"/>
-              </a:rPr>
-              <a:t>Argumentiraj</a:t>
-            </a:r>
-            <a:r>
-              <a:rPr lang="pl-PL" b="0" i="0" dirty="0">
-                <a:solidFill>
-                  <a:srgbClr val="333333"/>
-                </a:solidFill>
-                <a:effectLst/>
-                <a:latin typeface="Helvetica Neue"/>
-              </a:rPr>
-              <a:t> odločitev za </a:t>
-            </a:r>
-            <a:r>
-              <a:rPr lang="sl-SI" b="0" i="0">
-                <a:solidFill>
-                  <a:srgbClr val="333333"/>
-                </a:solidFill>
-                <a:effectLst/>
-                <a:latin typeface="Helvetica Neue"/>
-              </a:rPr>
-              <a:t>izbrane</a:t>
-            </a:r>
-            <a:r>
-              <a:rPr lang="pl-PL" b="0" i="0" dirty="0">
-                <a:solidFill>
-                  <a:srgbClr val="333333"/>
-                </a:solidFill>
-                <a:effectLst/>
-                <a:latin typeface="Helvetica Neue"/>
-              </a:rPr>
-              <a:t> (in prej prikazane) skupine.</a:t>
-            </a:r>
-            <a:endParaRPr lang="en-SI" dirty="0"/>
-          </a:p>
-        </p:txBody>
-      </p:sp>
+        </p:nvPicPr>
+        <p:blipFill rotWithShape="1">
+          <a:blip r:embed="rId2">
+            <a:extLst>
+              <a:ext uri="{28A0092B-C50C-407E-A947-70E740481C1C}">
+                <a14:useLocalDpi xmlns:a14="http://schemas.microsoft.com/office/drawing/2010/main" val="0"/>
+              </a:ext>
+            </a:extLst>
+          </a:blip>
+          <a:srcRect l="10259" t="9879" r="9147" b="2561"/>
+          <a:stretch/>
+        </p:blipFill>
+        <p:spPr>
+          <a:xfrm>
+            <a:off x="121361" y="8300"/>
+            <a:ext cx="11948160" cy="6866760"/>
+          </a:xfrm>
+        </p:spPr>
+      </p:pic>
     </p:spTree>
     <p:extLst>
       <p:ext uri="{BB962C8B-B14F-4D97-AF65-F5344CB8AC3E}">
-        <p14:creationId xmlns:p14="http://schemas.microsoft.com/office/powerpoint/2010/main" val="165307610"/>
+        <p14:creationId xmlns:p14="http://schemas.microsoft.com/office/powerpoint/2010/main" val="3451704611"/>
       </p:ext>
     </p:extLst>
   </p:cSld>
@@ -3863,6 +4819,419 @@
           <p:cNvPr id="2" name="Title 1">
             <a:extLst>
               <a:ext uri="{FF2B5EF4-FFF2-40B4-BE49-F238E27FC236}">
+                <a16:creationId xmlns:a16="http://schemas.microsoft.com/office/drawing/2014/main" id="{4F40CB26-36E2-5EDB-D9AC-D094F2749FEB}"/>
+              </a:ext>
+            </a:extLst>
+          </p:cNvPr>
+          <p:cNvSpPr>
+            <a:spLocks noGrp="1"/>
+          </p:cNvSpPr>
+          <p:nvPr>
+            <p:ph type="title"/>
+          </p:nvPr>
+        </p:nvSpPr>
+        <p:spPr/>
+        <p:txBody>
+          <a:bodyPr/>
+          <a:lstStyle/>
+          <a:p>
+            <a:endParaRPr lang="en-SI"/>
+          </a:p>
+        </p:txBody>
+      </p:sp>
+      <p:pic>
+        <p:nvPicPr>
+          <p:cNvPr id="5" name="Content Placeholder 4" descr="A colorful lines on a white background&#10;&#10;Description automatically generated">
+            <a:extLst>
+              <a:ext uri="{FF2B5EF4-FFF2-40B4-BE49-F238E27FC236}">
+                <a16:creationId xmlns:a16="http://schemas.microsoft.com/office/drawing/2014/main" id="{CEF14515-56F6-39A7-D7C2-7722925F7115}"/>
+              </a:ext>
+            </a:extLst>
+          </p:cNvPr>
+          <p:cNvPicPr>
+            <a:picLocks noGrp="1" noChangeAspect="1"/>
+          </p:cNvPicPr>
+          <p:nvPr>
+            <p:ph idx="1"/>
+          </p:nvPr>
+        </p:nvPicPr>
+        <p:blipFill rotWithShape="1">
+          <a:blip r:embed="rId2">
+            <a:extLst>
+              <a:ext uri="{28A0092B-C50C-407E-A947-70E740481C1C}">
+                <a14:useLocalDpi xmlns:a14="http://schemas.microsoft.com/office/drawing/2010/main" val="0"/>
+              </a:ext>
+            </a:extLst>
+          </a:blip>
+          <a:srcRect l="11216" t="9879" r="8252" b="6998"/>
+          <a:stretch/>
+        </p:blipFill>
+        <p:spPr>
+          <a:xfrm>
+            <a:off x="0" y="0"/>
+            <a:ext cx="12299646" cy="6715760"/>
+          </a:xfrm>
+        </p:spPr>
+      </p:pic>
+    </p:spTree>
+    <p:extLst>
+      <p:ext uri="{BB962C8B-B14F-4D97-AF65-F5344CB8AC3E}">
+        <p14:creationId xmlns:p14="http://schemas.microsoft.com/office/powerpoint/2010/main" val="3979641201"/>
+      </p:ext>
+    </p:extLst>
+  </p:cSld>
+  <p:clrMapOvr>
+    <a:masterClrMapping/>
+  </p:clrMapOvr>
+</p:sld>
+</file>
+
+<file path=ppt/slides/slide6.xml><?xml version="1.0" encoding="utf-8"?>
+<p:sld xmlns:a="http://schemas.openxmlformats.org/drawingml/2006/main" xmlns:r="http://schemas.openxmlformats.org/officeDocument/2006/relationships" xmlns:p="http://schemas.openxmlformats.org/presentationml/2006/main">
+  <p:cSld>
+    <p:spTree>
+      <p:nvGrpSpPr>
+        <p:cNvPr id="1" name=""/>
+        <p:cNvGrpSpPr/>
+        <p:nvPr/>
+      </p:nvGrpSpPr>
+      <p:grpSpPr>
+        <a:xfrm>
+          <a:off x="0" y="0"/>
+          <a:ext cx="0" cy="0"/>
+          <a:chOff x="0" y="0"/>
+          <a:chExt cx="0" cy="0"/>
+        </a:xfrm>
+      </p:grpSpPr>
+      <p:sp>
+        <p:nvSpPr>
+          <p:cNvPr id="2" name="Title 1">
+            <a:extLst>
+              <a:ext uri="{FF2B5EF4-FFF2-40B4-BE49-F238E27FC236}">
+                <a16:creationId xmlns:a16="http://schemas.microsoft.com/office/drawing/2014/main" id="{FC4956DA-32A2-19B5-75BE-50DFBA508C50}"/>
+              </a:ext>
+            </a:extLst>
+          </p:cNvPr>
+          <p:cNvSpPr>
+            <a:spLocks noGrp="1"/>
+          </p:cNvSpPr>
+          <p:nvPr>
+            <p:ph type="title"/>
+          </p:nvPr>
+        </p:nvSpPr>
+        <p:spPr/>
+        <p:txBody>
+          <a:bodyPr/>
+          <a:lstStyle/>
+          <a:p>
+            <a:r>
+              <a:rPr lang="sl-SI" dirty="0"/>
+              <a:t>Argumenti</a:t>
+            </a:r>
+          </a:p>
+        </p:txBody>
+      </p:sp>
+      <p:sp>
+        <p:nvSpPr>
+          <p:cNvPr id="3" name="Content Placeholder 2">
+            <a:extLst>
+              <a:ext uri="{FF2B5EF4-FFF2-40B4-BE49-F238E27FC236}">
+                <a16:creationId xmlns:a16="http://schemas.microsoft.com/office/drawing/2014/main" id="{08DBEF08-4EA8-7388-1233-19FBA6713823}"/>
+              </a:ext>
+            </a:extLst>
+          </p:cNvPr>
+          <p:cNvSpPr>
+            <a:spLocks noGrp="1"/>
+          </p:cNvSpPr>
+          <p:nvPr>
+            <p:ph idx="1"/>
+          </p:nvPr>
+        </p:nvSpPr>
+        <p:spPr/>
+        <p:txBody>
+          <a:bodyPr/>
+          <a:lstStyle/>
+          <a:p>
+            <a:r>
+              <a:rPr lang="sl-SI" b="0" i="0" dirty="0">
+                <a:solidFill>
+                  <a:srgbClr val="333333"/>
+                </a:solidFill>
+                <a:effectLst/>
+                <a:latin typeface="Helvetica Neue"/>
+              </a:rPr>
+              <a:t>Argumentiraj</a:t>
+            </a:r>
+            <a:r>
+              <a:rPr lang="pl-PL" b="0" i="0" dirty="0">
+                <a:solidFill>
+                  <a:srgbClr val="333333"/>
+                </a:solidFill>
+                <a:effectLst/>
+                <a:latin typeface="Helvetica Neue"/>
+              </a:rPr>
+              <a:t> odločitev za </a:t>
+            </a:r>
+            <a:r>
+              <a:rPr lang="sl-SI" b="0" i="0" dirty="0">
+                <a:solidFill>
+                  <a:srgbClr val="333333"/>
+                </a:solidFill>
+                <a:effectLst/>
+                <a:latin typeface="Helvetica Neue"/>
+              </a:rPr>
+              <a:t>izbrane</a:t>
+            </a:r>
+            <a:r>
+              <a:rPr lang="pl-PL" b="0" i="0" dirty="0">
+                <a:solidFill>
+                  <a:srgbClr val="333333"/>
+                </a:solidFill>
+                <a:effectLst/>
+                <a:latin typeface="Helvetica Neue"/>
+              </a:rPr>
+              <a:t> (in prej prikazane) skupine.</a:t>
+            </a:r>
+            <a:endParaRPr lang="en-GB" b="0" i="0" dirty="0">
+              <a:solidFill>
+                <a:srgbClr val="333333"/>
+              </a:solidFill>
+              <a:effectLst/>
+              <a:latin typeface="Helvetica Neue"/>
+            </a:endParaRPr>
+          </a:p>
+          <a:p>
+            <a:r>
+              <a:rPr lang="en-GB" dirty="0" err="1"/>
+              <a:t>Predvsem</a:t>
+            </a:r>
+            <a:r>
+              <a:rPr lang="en-GB" dirty="0"/>
+              <a:t> </a:t>
+            </a:r>
+            <a:r>
+              <a:rPr lang="en-GB" dirty="0" err="1"/>
+              <a:t>razložljivost</a:t>
+            </a:r>
+            <a:r>
+              <a:rPr lang="en-GB" dirty="0"/>
+              <a:t> </a:t>
+            </a:r>
+            <a:r>
+              <a:rPr lang="en-GB" dirty="0" err="1"/>
+              <a:t>povezanosti</a:t>
+            </a:r>
+            <a:r>
+              <a:rPr lang="en-GB" dirty="0"/>
+              <a:t>.</a:t>
+            </a:r>
+          </a:p>
+          <a:p>
+            <a:r>
+              <a:rPr lang="en-GB" dirty="0" err="1"/>
+              <a:t>Če</a:t>
+            </a:r>
+            <a:r>
+              <a:rPr lang="en-GB" dirty="0"/>
+              <a:t> bi </a:t>
+            </a:r>
+            <a:r>
+              <a:rPr lang="en-GB" dirty="0" err="1"/>
+              <a:t>odrezali</a:t>
+            </a:r>
+            <a:r>
+              <a:rPr lang="en-GB" dirty="0"/>
+              <a:t> </a:t>
+            </a:r>
+            <a:r>
+              <a:rPr lang="en-GB" dirty="0" err="1"/>
+              <a:t>dendrogramvišje</a:t>
+            </a:r>
+            <a:r>
+              <a:rPr lang="en-GB" dirty="0"/>
+              <a:t>, se </a:t>
+            </a:r>
+            <a:r>
+              <a:rPr lang="en-GB" dirty="0" err="1"/>
+              <a:t>skupaj</a:t>
+            </a:r>
+            <a:r>
+              <a:rPr lang="en-GB" dirty="0"/>
+              <a:t> </a:t>
+            </a:r>
+            <a:r>
+              <a:rPr lang="en-GB" dirty="0" err="1"/>
+              <a:t>poveže</a:t>
+            </a:r>
+            <a:r>
+              <a:rPr lang="en-GB" dirty="0"/>
+              <a:t> </a:t>
+            </a:r>
+            <a:r>
+              <a:rPr lang="en-GB" dirty="0" err="1"/>
+              <a:t>veliko</a:t>
+            </a:r>
+            <a:r>
+              <a:rPr lang="en-GB" dirty="0"/>
+              <a:t> </a:t>
+            </a:r>
+            <a:r>
+              <a:rPr lang="en-GB" dirty="0" err="1"/>
+              <a:t>skupin</a:t>
+            </a:r>
+            <a:r>
+              <a:rPr lang="en-GB" dirty="0"/>
+              <a:t>, ki </a:t>
+            </a:r>
+            <a:r>
+              <a:rPr lang="en-GB" dirty="0" err="1"/>
+              <a:t>nimajo</a:t>
+            </a:r>
+            <a:r>
+              <a:rPr lang="en-GB" dirty="0"/>
+              <a:t> </a:t>
+            </a:r>
+            <a:r>
+              <a:rPr lang="en-GB" dirty="0" err="1"/>
+              <a:t>nobene</a:t>
+            </a:r>
+            <a:r>
+              <a:rPr lang="en-GB" dirty="0"/>
+              <a:t> </a:t>
+            </a:r>
+            <a:r>
+              <a:rPr lang="en-GB" dirty="0" err="1"/>
+              <a:t>dobre</a:t>
+            </a:r>
+            <a:r>
+              <a:rPr lang="en-GB" dirty="0"/>
+              <a:t> </a:t>
+            </a:r>
+            <a:r>
+              <a:rPr lang="en-GB" dirty="0" err="1"/>
+              <a:t>povezanosti</a:t>
+            </a:r>
+            <a:r>
+              <a:rPr lang="en-GB" dirty="0"/>
+              <a:t>.</a:t>
+            </a:r>
+          </a:p>
+          <a:p>
+            <a:r>
+              <a:rPr lang="en-GB" dirty="0" err="1"/>
+              <a:t>Če</a:t>
+            </a:r>
+            <a:r>
+              <a:rPr lang="en-GB" dirty="0"/>
+              <a:t> bi </a:t>
+            </a:r>
+            <a:r>
+              <a:rPr lang="en-GB" dirty="0" err="1"/>
+              <a:t>lahko</a:t>
+            </a:r>
+            <a:r>
+              <a:rPr lang="en-GB" dirty="0"/>
+              <a:t> </a:t>
+            </a:r>
+            <a:r>
+              <a:rPr lang="en-GB" dirty="0" err="1"/>
+              <a:t>izbiral</a:t>
+            </a:r>
+            <a:r>
+              <a:rPr lang="en-GB" dirty="0"/>
+              <a:t>, bi za </a:t>
+            </a:r>
+            <a:r>
+              <a:rPr lang="en-GB" dirty="0" err="1"/>
+              <a:t>prve</a:t>
+            </a:r>
+            <a:r>
+              <a:rPr lang="en-GB" dirty="0"/>
+              <a:t> </a:t>
+            </a:r>
+            <a:r>
+              <a:rPr lang="en-GB" dirty="0" err="1"/>
+              <a:t>korake</a:t>
+            </a:r>
+            <a:r>
+              <a:rPr lang="en-GB" dirty="0"/>
+              <a:t> </a:t>
+            </a:r>
+            <a:r>
+              <a:rPr lang="en-GB" dirty="0" err="1"/>
+              <a:t>uporabljal</a:t>
+            </a:r>
+            <a:r>
+              <a:rPr lang="en-GB" dirty="0"/>
+              <a:t> </a:t>
+            </a:r>
+            <a:r>
+              <a:rPr lang="en-GB" dirty="0" err="1"/>
+              <a:t>popolno</a:t>
+            </a:r>
+            <a:r>
+              <a:rPr lang="en-GB" dirty="0"/>
+              <a:t> </a:t>
+            </a:r>
+            <a:r>
+              <a:rPr lang="en-GB" dirty="0" err="1"/>
+              <a:t>povezanost</a:t>
+            </a:r>
+            <a:r>
+              <a:rPr lang="en-GB" dirty="0"/>
+              <a:t>, </a:t>
+            </a:r>
+            <a:r>
+              <a:rPr lang="en-GB" dirty="0" err="1"/>
+              <a:t>kasneje</a:t>
+            </a:r>
+            <a:r>
+              <a:rPr lang="en-GB" dirty="0"/>
+              <a:t> pa </a:t>
+            </a:r>
+            <a:r>
+              <a:rPr lang="en-GB" dirty="0" err="1"/>
+              <a:t>povprečno</a:t>
+            </a:r>
+            <a:endParaRPr lang="en-SI" dirty="0"/>
+          </a:p>
+        </p:txBody>
+      </p:sp>
+    </p:spTree>
+    <p:extLst>
+      <p:ext uri="{BB962C8B-B14F-4D97-AF65-F5344CB8AC3E}">
+        <p14:creationId xmlns:p14="http://schemas.microsoft.com/office/powerpoint/2010/main" val="165307610"/>
+      </p:ext>
+    </p:extLst>
+  </p:cSld>
+  <p:clrMapOvr>
+    <a:masterClrMapping/>
+  </p:clrMapOvr>
+</p:sld>
+</file>
+
+<file path=ppt/slides/slide7.xml><?xml version="1.0" encoding="utf-8"?>
+<p:sld xmlns:a="http://schemas.openxmlformats.org/drawingml/2006/main" xmlns:r="http://schemas.openxmlformats.org/officeDocument/2006/relationships" xmlns:p="http://schemas.openxmlformats.org/presentationml/2006/main">
+  <p:cSld>
+    <p:spTree>
+      <p:nvGrpSpPr>
+        <p:cNvPr id="1" name=""/>
+        <p:cNvGrpSpPr/>
+        <p:nvPr/>
+      </p:nvGrpSpPr>
+      <p:grpSpPr>
+        <a:xfrm>
+          <a:off x="0" y="0"/>
+          <a:ext cx="0" cy="0"/>
+          <a:chOff x="0" y="0"/>
+          <a:chExt cx="0" cy="0"/>
+        </a:xfrm>
+      </p:grpSpPr>
+      <p:sp>
+        <p:nvSpPr>
+          <p:cNvPr id="2" name="Title 1">
+            <a:extLst>
+              <a:ext uri="{FF2B5EF4-FFF2-40B4-BE49-F238E27FC236}">
                 <a16:creationId xmlns:a16="http://schemas.microsoft.com/office/drawing/2014/main" id="{BD63D5AF-066D-260E-F295-DF9B5DCB1B87}"/>
               </a:ext>
             </a:extLst>
@@ -3922,9 +5291,23 @@
                 <a:effectLst/>
                 <a:latin typeface="Helvetica Neue"/>
               </a:rPr>
-              <a:t>Razlaga zanimivih skupin. Geopolitični vidiki in analiza glasovanja skupin. Poleg analize na kratko opišite postopek, ki privede do rezultatov glede preferiranih in nepreferiranih držav.</a:t>
-            </a:r>
-            <a:endParaRPr lang="en-SI" dirty="0"/>
+              <a:t>Razlaga zanimivih skupin. Geopolitični vidiki in analiza glasovanja skupin. </a:t>
+            </a:r>
+            <a:r>
+              <a:rPr lang="sl-SI" b="0" i="0" dirty="0">
+                <a:solidFill>
+                  <a:srgbClr val="FF0000"/>
+                </a:solidFill>
+                <a:effectLst/>
+                <a:latin typeface="Helvetica Neue"/>
+              </a:rPr>
+              <a:t>Poleg analize na kratko opišite postopek, ki privede do rezultatov glede preferiranih in nepreferiranih držav.</a:t>
+            </a:r>
+            <a:endParaRPr lang="en-SI" dirty="0">
+              <a:solidFill>
+                <a:srgbClr val="FF0000"/>
+              </a:solidFill>
+            </a:endParaRPr>
           </a:p>
         </p:txBody>
       </p:sp>

</xml_diff>